<commit_message>
add figure for setting up isosurface drawing
</commit_message>
<xml_diff>
--- a/smv/figures/iso_setup.pptx
+++ b/smv/figures/iso_setup.pptx
@@ -8,7 +8,7 @@
     <p:sldId id="257" r:id="rId2"/>
   </p:sldIdLst>
   <p:sldSz cx="9144000" cy="6858000" type="screen4x3"/>
-  <p:notesSz cx="7004050" cy="9223375"/>
+  <p:notesSz cx="7315200" cy="9601200"/>
   <p:defaultTextStyle>
     <a:defPPr>
       <a:defRPr lang="en-US"/>
@@ -3187,52 +3187,6 @@
           </a:fontRef>
         </p:style>
       </p:cxnSp>
-      <p:sp>
-        <p:nvSpPr>
-          <p:cNvPr id="8" name="Oval 7">
-            <a:extLst>
-              <a:ext uri="{FF2B5EF4-FFF2-40B4-BE49-F238E27FC236}">
-                <a16:creationId xmlns:a16="http://schemas.microsoft.com/office/drawing/2014/main" id="{2DD86594-96D1-43B3-9377-542AADFC3CDE}"/>
-              </a:ext>
-            </a:extLst>
-          </p:cNvPr>
-          <p:cNvSpPr/>
-          <p:nvPr/>
-        </p:nvSpPr>
-        <p:spPr>
-          <a:xfrm>
-            <a:off x="2438399" y="5715000"/>
-            <a:ext cx="152400" cy="152400"/>
-          </a:xfrm>
-          <a:prstGeom prst="ellipse">
-            <a:avLst/>
-          </a:prstGeom>
-        </p:spPr>
-        <p:style>
-          <a:lnRef idx="2">
-            <a:schemeClr val="accent1">
-              <a:shade val="50000"/>
-            </a:schemeClr>
-          </a:lnRef>
-          <a:fillRef idx="1">
-            <a:schemeClr val="accent1"/>
-          </a:fillRef>
-          <a:effectRef idx="0">
-            <a:schemeClr val="accent1"/>
-          </a:effectRef>
-          <a:fontRef idx="minor">
-            <a:schemeClr val="lt1"/>
-          </a:fontRef>
-        </p:style>
-        <p:txBody>
-          <a:bodyPr rtlCol="0" anchor="ctr"/>
-          <a:lstStyle/>
-          <a:p>
-            <a:pPr algn="ctr"/>
-            <a:endParaRPr lang="en-US"/>
-          </a:p>
-        </p:txBody>
-      </p:sp>
       <p:cxnSp>
         <p:nvCxnSpPr>
           <p:cNvPr id="11" name="Straight Arrow Connector 10">

</xml_diff>